<commit_message>
Updated presentation for Dr Herceg
</commit_message>
<xml_diff>
--- a/Origins of Encryption.pptx
+++ b/Origins of Encryption.pptx
@@ -111,6 +111,11 @@
       </a:defRPr>
     </a:lvl9pPr>
   </p:defaultTextStyle>
+  <p:extLst>
+    <p:ext uri="{EFAFB233-063F-42B5-8137-9DF3F51BA10A}">
+      <p15:sldGuideLst xmlns:p15="http://schemas.microsoft.com/office/powerpoint/2012/main"/>
+    </p:ext>
+  </p:extLst>
 </p:presentation>
 </file>
 
@@ -3712,8 +3717,8 @@
         </p:blipFill>
         <p:spPr bwMode="auto">
           <a:xfrm>
-            <a:off x="1136780" y="2457653"/>
-            <a:ext cx="3565849" cy="2138030"/>
+            <a:off x="1362811" y="2609813"/>
+            <a:ext cx="3106447" cy="1862579"/>
           </a:xfrm>
           <a:prstGeom prst="rect">
             <a:avLst/>
@@ -3872,14 +3877,14 @@
                 <a:gridCol w="4064000">
                   <a:extLst>
                     <a:ext uri="{9D8B030D-6E8A-4147-A177-3AD203B41FA5}">
-                      <a16:colId xmlns:a16="http://schemas.microsoft.com/office/drawing/2014/main" val="3407978984"/>
+                      <a16:colId xmlns:a16="http://schemas.microsoft.com/office/drawing/2014/main" xmlns="" val="3407978984"/>
                     </a:ext>
                   </a:extLst>
                 </a:gridCol>
                 <a:gridCol w="4064000">
                   <a:extLst>
                     <a:ext uri="{9D8B030D-6E8A-4147-A177-3AD203B41FA5}">
-                      <a16:colId xmlns:a16="http://schemas.microsoft.com/office/drawing/2014/main" val="2240709183"/>
+                      <a16:colId xmlns:a16="http://schemas.microsoft.com/office/drawing/2014/main" xmlns="" val="2240709183"/>
                     </a:ext>
                   </a:extLst>
                 </a:gridCol>
@@ -3915,7 +3920,7 @@
                 </a:tc>
                 <a:extLst>
                   <a:ext uri="{0D108BD9-81ED-4DB2-BD59-A6C34878D82A}">
-                    <a16:rowId xmlns:a16="http://schemas.microsoft.com/office/drawing/2014/main" val="2574911065"/>
+                    <a16:rowId xmlns:a16="http://schemas.microsoft.com/office/drawing/2014/main" xmlns="" val="2574911065"/>
                   </a:ext>
                 </a:extLst>
               </a:tr>
@@ -3958,7 +3963,7 @@
                 </a:tc>
                 <a:extLst>
                   <a:ext uri="{0D108BD9-81ED-4DB2-BD59-A6C34878D82A}">
-                    <a16:rowId xmlns:a16="http://schemas.microsoft.com/office/drawing/2014/main" val="3995097756"/>
+                    <a16:rowId xmlns:a16="http://schemas.microsoft.com/office/drawing/2014/main" xmlns="" val="3995097756"/>
                   </a:ext>
                 </a:extLst>
               </a:tr>

</xml_diff>